<commit_message>
Small addition presentation + comment fix
</commit_message>
<xml_diff>
--- a/presentation/presentation2.0.pptx
+++ b/presentation/presentation2.0.pptx
@@ -7,7 +7,7 @@
     <p:sldMasterId id="2147483656" r:id="rId3"/>
   </p:sldMasterIdLst>
   <p:notesMasterIdLst>
-    <p:notesMasterId r:id="rId25"/>
+    <p:notesMasterId r:id="rId24"/>
   </p:notesMasterIdLst>
   <p:sldIdLst>
     <p:sldId id="256" r:id="rId4"/>
@@ -29,8 +29,7 @@
     <p:sldId id="276" r:id="rId20"/>
     <p:sldId id="277" r:id="rId21"/>
     <p:sldId id="272" r:id="rId22"/>
-    <p:sldId id="265" r:id="rId23"/>
-    <p:sldId id="264" r:id="rId24"/>
+    <p:sldId id="264" r:id="rId23"/>
   </p:sldIdLst>
   <p:sldSz cx="9144000" cy="6858000" type="screen4x3"/>
   <p:notesSz cx="6858000" cy="9144000"/>
@@ -161,7 +160,7 @@
   </p:defaultTextStyle>
   <p:extLst>
     <p:ext uri="{521415D9-36F7-43E2-AB2F-B90AF26B5E84}">
-      <p14:sectionLst xmlns:p14="http://schemas.microsoft.com/office/powerpoint/2010/main">
+      <p14:sectionLst xmlns:p14="http://schemas.microsoft.com/office/powerpoint/2010/main" xmlns="">
         <p14:section name="Default Section" id="{71789B04-11C9-41C3-9DEC-D783814861A0}">
           <p14:sldIdLst>
             <p14:sldId id="256"/>
@@ -258,14 +257,14 @@
           <a:effectLst/>
           <a:extLst>
             <a:ext uri="{909E8E84-426E-40DD-AFC4-6F175D3DCCD1}">
-              <a14:hiddenFill xmlns:a14="http://schemas.microsoft.com/office/drawing/2010/main">
+              <a14:hiddenFill xmlns:a14="http://schemas.microsoft.com/office/drawing/2010/main" xmlns="">
                 <a:solidFill>
                   <a:schemeClr val="accent1"/>
                 </a:solidFill>
               </a14:hiddenFill>
             </a:ext>
             <a:ext uri="{91240B29-F687-4F45-9708-019B960494DF}">
-              <a14:hiddenLine xmlns:a14="http://schemas.microsoft.com/office/drawing/2010/main" w="9525">
+              <a14:hiddenLine xmlns:a14="http://schemas.microsoft.com/office/drawing/2010/main" xmlns="" w="9525">
                 <a:solidFill>
                   <a:schemeClr val="tx1"/>
                 </a:solidFill>
@@ -275,7 +274,7 @@
               </a14:hiddenLine>
             </a:ext>
             <a:ext uri="{AF507438-7753-43E0-B8FC-AC1667EBCBE1}">
-              <a14:hiddenEffects xmlns:a14="http://schemas.microsoft.com/office/drawing/2010/main">
+              <a14:hiddenEffects xmlns:a14="http://schemas.microsoft.com/office/drawing/2010/main" xmlns="">
                 <a:effectLst>
                   <a:outerShdw dist="35921" dir="2700000" algn="ctr" rotWithShape="0">
                     <a:schemeClr val="bg2"/>
@@ -326,14 +325,14 @@
           <a:effectLst/>
           <a:extLst>
             <a:ext uri="{909E8E84-426E-40DD-AFC4-6F175D3DCCD1}">
-              <a14:hiddenFill xmlns:a14="http://schemas.microsoft.com/office/drawing/2010/main">
+              <a14:hiddenFill xmlns:a14="http://schemas.microsoft.com/office/drawing/2010/main" xmlns="">
                 <a:solidFill>
                   <a:schemeClr val="accent1"/>
                 </a:solidFill>
               </a14:hiddenFill>
             </a:ext>
             <a:ext uri="{91240B29-F687-4F45-9708-019B960494DF}">
-              <a14:hiddenLine xmlns:a14="http://schemas.microsoft.com/office/drawing/2010/main" w="9525">
+              <a14:hiddenLine xmlns:a14="http://schemas.microsoft.com/office/drawing/2010/main" xmlns="" w="9525">
                 <a:solidFill>
                   <a:schemeClr val="tx1"/>
                 </a:solidFill>
@@ -343,7 +342,7 @@
               </a14:hiddenLine>
             </a:ext>
             <a:ext uri="{AF507438-7753-43E0-B8FC-AC1667EBCBE1}">
-              <a14:hiddenEffects xmlns:a14="http://schemas.microsoft.com/office/drawing/2010/main">
+              <a14:hiddenEffects xmlns:a14="http://schemas.microsoft.com/office/drawing/2010/main" xmlns="">
                 <a:effectLst>
                   <a:outerShdw dist="35921" dir="2700000" algn="ctr" rotWithShape="0">
                     <a:schemeClr val="bg2"/>
@@ -399,7 +398,7 @@
           <a:effectLst/>
           <a:extLst>
             <a:ext uri="{AF507438-7753-43E0-B8FC-AC1667EBCBE1}">
-              <a14:hiddenEffects xmlns:a14="http://schemas.microsoft.com/office/drawing/2010/main">
+              <a14:hiddenEffects xmlns:a14="http://schemas.microsoft.com/office/drawing/2010/main" xmlns="">
                 <a:effectLst>
                   <a:outerShdw dist="35921" dir="2700000" algn="ctr" rotWithShape="0">
                     <a:srgbClr val="808080"/>
@@ -408,7 +407,7 @@
               </a14:hiddenEffects>
             </a:ext>
             <a:ext uri="{53640926-AAD7-44D8-BBD7-CCE9431645EC}">
-              <a14:shadowObscured xmlns:a14="http://schemas.microsoft.com/office/drawing/2010/main" val="1"/>
+              <a14:shadowObscured xmlns:a14="http://schemas.microsoft.com/office/drawing/2010/main" xmlns="" val="1"/>
             </a:ext>
           </a:extLst>
         </p:spPr>
@@ -438,14 +437,14 @@
           <a:effectLst/>
           <a:extLst>
             <a:ext uri="{909E8E84-426E-40DD-AFC4-6F175D3DCCD1}">
-              <a14:hiddenFill xmlns:a14="http://schemas.microsoft.com/office/drawing/2010/main">
+              <a14:hiddenFill xmlns:a14="http://schemas.microsoft.com/office/drawing/2010/main" xmlns="">
                 <a:solidFill>
                   <a:schemeClr val="accent1"/>
                 </a:solidFill>
               </a14:hiddenFill>
             </a:ext>
             <a:ext uri="{91240B29-F687-4F45-9708-019B960494DF}">
-              <a14:hiddenLine xmlns:a14="http://schemas.microsoft.com/office/drawing/2010/main" w="9525">
+              <a14:hiddenLine xmlns:a14="http://schemas.microsoft.com/office/drawing/2010/main" xmlns="" w="9525">
                 <a:solidFill>
                   <a:schemeClr val="tx1"/>
                 </a:solidFill>
@@ -455,7 +454,7 @@
               </a14:hiddenLine>
             </a:ext>
             <a:ext uri="{AF507438-7753-43E0-B8FC-AC1667EBCBE1}">
-              <a14:hiddenEffects xmlns:a14="http://schemas.microsoft.com/office/drawing/2010/main">
+              <a14:hiddenEffects xmlns:a14="http://schemas.microsoft.com/office/drawing/2010/main" xmlns="">
                 <a:effectLst>
                   <a:outerShdw dist="35921" dir="2700000" algn="ctr" rotWithShape="0">
                     <a:schemeClr val="bg2"/>
@@ -534,14 +533,14 @@
           <a:effectLst/>
           <a:extLst>
             <a:ext uri="{909E8E84-426E-40DD-AFC4-6F175D3DCCD1}">
-              <a14:hiddenFill xmlns:a14="http://schemas.microsoft.com/office/drawing/2010/main">
+              <a14:hiddenFill xmlns:a14="http://schemas.microsoft.com/office/drawing/2010/main" xmlns="">
                 <a:solidFill>
                   <a:schemeClr val="accent1"/>
                 </a:solidFill>
               </a14:hiddenFill>
             </a:ext>
             <a:ext uri="{91240B29-F687-4F45-9708-019B960494DF}">
-              <a14:hiddenLine xmlns:a14="http://schemas.microsoft.com/office/drawing/2010/main" w="9525">
+              <a14:hiddenLine xmlns:a14="http://schemas.microsoft.com/office/drawing/2010/main" xmlns="" w="9525">
                 <a:solidFill>
                   <a:schemeClr val="tx1"/>
                 </a:solidFill>
@@ -551,7 +550,7 @@
               </a14:hiddenLine>
             </a:ext>
             <a:ext uri="{AF507438-7753-43E0-B8FC-AC1667EBCBE1}">
-              <a14:hiddenEffects xmlns:a14="http://schemas.microsoft.com/office/drawing/2010/main">
+              <a14:hiddenEffects xmlns:a14="http://schemas.microsoft.com/office/drawing/2010/main" xmlns="">
                 <a:effectLst>
                   <a:outerShdw dist="35921" dir="2700000" algn="ctr" rotWithShape="0">
                     <a:schemeClr val="bg2"/>
@@ -602,14 +601,14 @@
           <a:effectLst/>
           <a:extLst>
             <a:ext uri="{909E8E84-426E-40DD-AFC4-6F175D3DCCD1}">
-              <a14:hiddenFill xmlns:a14="http://schemas.microsoft.com/office/drawing/2010/main">
+              <a14:hiddenFill xmlns:a14="http://schemas.microsoft.com/office/drawing/2010/main" xmlns="">
                 <a:solidFill>
                   <a:schemeClr val="accent1"/>
                 </a:solidFill>
               </a14:hiddenFill>
             </a:ext>
             <a:ext uri="{91240B29-F687-4F45-9708-019B960494DF}">
-              <a14:hiddenLine xmlns:a14="http://schemas.microsoft.com/office/drawing/2010/main" w="9525">
+              <a14:hiddenLine xmlns:a14="http://schemas.microsoft.com/office/drawing/2010/main" xmlns="" w="9525">
                 <a:solidFill>
                   <a:schemeClr val="tx1"/>
                 </a:solidFill>
@@ -619,7 +618,7 @@
               </a14:hiddenLine>
             </a:ext>
             <a:ext uri="{AF507438-7753-43E0-B8FC-AC1667EBCBE1}">
-              <a14:hiddenEffects xmlns:a14="http://schemas.microsoft.com/office/drawing/2010/main">
+              <a14:hiddenEffects xmlns:a14="http://schemas.microsoft.com/office/drawing/2010/main" xmlns="">
                 <a:effectLst>
                   <a:outerShdw dist="35921" dir="2700000" algn="ctr" rotWithShape="0">
                     <a:schemeClr val="bg2"/>
@@ -653,7 +652,7 @@
     </p:spTree>
     <p:extLst>
       <p:ext uri="{BB962C8B-B14F-4D97-AF65-F5344CB8AC3E}">
-        <p14:creationId xmlns:p14="http://schemas.microsoft.com/office/powerpoint/2010/main" val="1953554514"/>
+        <p14:creationId xmlns:p14="http://schemas.microsoft.com/office/powerpoint/2010/main" xmlns="" val="1953554514"/>
       </p:ext>
     </p:extLst>
   </p:cSld>
@@ -1074,7 +1073,7 @@
     </p:spTree>
     <p:extLst>
       <p:ext uri="{BB962C8B-B14F-4D97-AF65-F5344CB8AC3E}">
-        <p14:creationId xmlns:p14="http://schemas.microsoft.com/office/powerpoint/2010/main" val="2115042977"/>
+        <p14:creationId xmlns:p14="http://schemas.microsoft.com/office/powerpoint/2010/main" xmlns="" val="2115042977"/>
       </p:ext>
     </p:extLst>
   </p:cSld>
@@ -1276,7 +1275,7 @@
     </p:spTree>
     <p:extLst>
       <p:ext uri="{BB962C8B-B14F-4D97-AF65-F5344CB8AC3E}">
-        <p14:creationId xmlns:p14="http://schemas.microsoft.com/office/powerpoint/2010/main" val="3593635643"/>
+        <p14:creationId xmlns:p14="http://schemas.microsoft.com/office/powerpoint/2010/main" xmlns="" val="3593635643"/>
       </p:ext>
     </p:extLst>
   </p:cSld>
@@ -1315,7 +1314,7 @@
           <a:blip r:embed="rId2" cstate="print">
             <a:extLst>
               <a:ext uri="{28A0092B-C50C-407E-A947-70E740481C1C}">
-                <a14:useLocalDpi xmlns:a14="http://schemas.microsoft.com/office/drawing/2010/main" val="0"/>
+                <a14:useLocalDpi xmlns:a14="http://schemas.microsoft.com/office/drawing/2010/main" xmlns="" val="0"/>
               </a:ext>
             </a:extLst>
           </a:blip>
@@ -1335,7 +1334,7 @@
           <a:noFill/>
           <a:extLst>
             <a:ext uri="{909E8E84-426E-40DD-AFC4-6F175D3DCCD1}">
-              <a14:hiddenFill xmlns:a14="http://schemas.microsoft.com/office/drawing/2010/main">
+              <a14:hiddenFill xmlns:a14="http://schemas.microsoft.com/office/drawing/2010/main" xmlns="">
                 <a:solidFill>
                   <a:srgbClr val="FFFFFF"/>
                 </a:solidFill>
@@ -1356,7 +1355,7 @@
           <a:blip r:embed="rId3" cstate="print">
             <a:extLst>
               <a:ext uri="{28A0092B-C50C-407E-A947-70E740481C1C}">
-                <a14:useLocalDpi xmlns:a14="http://schemas.microsoft.com/office/drawing/2010/main" val="0"/>
+                <a14:useLocalDpi xmlns:a14="http://schemas.microsoft.com/office/drawing/2010/main" xmlns="" val="0"/>
               </a:ext>
             </a:extLst>
           </a:blip>
@@ -1376,7 +1375,7 @@
           <a:noFill/>
           <a:extLst>
             <a:ext uri="{909E8E84-426E-40DD-AFC4-6F175D3DCCD1}">
-              <a14:hiddenFill xmlns:a14="http://schemas.microsoft.com/office/drawing/2010/main">
+              <a14:hiddenFill xmlns:a14="http://schemas.microsoft.com/office/drawing/2010/main" xmlns="">
                 <a:solidFill>
                   <a:srgbClr val="FFFFFF"/>
                 </a:solidFill>
@@ -1645,7 +1644,7 @@
     </p:spTree>
     <p:extLst>
       <p:ext uri="{BB962C8B-B14F-4D97-AF65-F5344CB8AC3E}">
-        <p14:creationId xmlns:p14="http://schemas.microsoft.com/office/powerpoint/2010/main" val="3725975958"/>
+        <p14:creationId xmlns:p14="http://schemas.microsoft.com/office/powerpoint/2010/main" xmlns="" val="3725975958"/>
       </p:ext>
     </p:extLst>
   </p:cSld>
@@ -1859,7 +1858,7 @@
     </p:spTree>
     <p:extLst>
       <p:ext uri="{BB962C8B-B14F-4D97-AF65-F5344CB8AC3E}">
-        <p14:creationId xmlns:p14="http://schemas.microsoft.com/office/powerpoint/2010/main" val="2579298552"/>
+        <p14:creationId xmlns:p14="http://schemas.microsoft.com/office/powerpoint/2010/main" xmlns="" val="2579298552"/>
       </p:ext>
     </p:extLst>
   </p:cSld>
@@ -2169,7 +2168,7 @@
     </p:spTree>
     <p:extLst>
       <p:ext uri="{BB962C8B-B14F-4D97-AF65-F5344CB8AC3E}">
-        <p14:creationId xmlns:p14="http://schemas.microsoft.com/office/powerpoint/2010/main" val="2331762669"/>
+        <p14:creationId xmlns:p14="http://schemas.microsoft.com/office/powerpoint/2010/main" xmlns="" val="2331762669"/>
       </p:ext>
     </p:extLst>
   </p:cSld>
@@ -2618,7 +2617,7 @@
     </p:spTree>
     <p:extLst>
       <p:ext uri="{BB962C8B-B14F-4D97-AF65-F5344CB8AC3E}">
-        <p14:creationId xmlns:p14="http://schemas.microsoft.com/office/powerpoint/2010/main" val="2823705037"/>
+        <p14:creationId xmlns:p14="http://schemas.microsoft.com/office/powerpoint/2010/main" xmlns="" val="2823705037"/>
       </p:ext>
     </p:extLst>
   </p:cSld>
@@ -2758,7 +2757,7 @@
     </p:spTree>
     <p:extLst>
       <p:ext uri="{BB962C8B-B14F-4D97-AF65-F5344CB8AC3E}">
-        <p14:creationId xmlns:p14="http://schemas.microsoft.com/office/powerpoint/2010/main" val="902082003"/>
+        <p14:creationId xmlns:p14="http://schemas.microsoft.com/office/powerpoint/2010/main" xmlns="" val="902082003"/>
       </p:ext>
     </p:extLst>
   </p:cSld>
@@ -2875,7 +2874,7 @@
     </p:spTree>
     <p:extLst>
       <p:ext uri="{BB962C8B-B14F-4D97-AF65-F5344CB8AC3E}">
-        <p14:creationId xmlns:p14="http://schemas.microsoft.com/office/powerpoint/2010/main" val="454438569"/>
+        <p14:creationId xmlns:p14="http://schemas.microsoft.com/office/powerpoint/2010/main" xmlns="" val="454438569"/>
       </p:ext>
     </p:extLst>
   </p:cSld>
@@ -3174,7 +3173,7 @@
     </p:spTree>
     <p:extLst>
       <p:ext uri="{BB962C8B-B14F-4D97-AF65-F5344CB8AC3E}">
-        <p14:creationId xmlns:p14="http://schemas.microsoft.com/office/powerpoint/2010/main" val="3238251866"/>
+        <p14:creationId xmlns:p14="http://schemas.microsoft.com/office/powerpoint/2010/main" xmlns="" val="3238251866"/>
       </p:ext>
     </p:extLst>
   </p:cSld>
@@ -3366,7 +3365,7 @@
     </p:spTree>
     <p:extLst>
       <p:ext uri="{BB962C8B-B14F-4D97-AF65-F5344CB8AC3E}">
-        <p14:creationId xmlns:p14="http://schemas.microsoft.com/office/powerpoint/2010/main" val="644160068"/>
+        <p14:creationId xmlns:p14="http://schemas.microsoft.com/office/powerpoint/2010/main" xmlns="" val="644160068"/>
       </p:ext>
     </p:extLst>
   </p:cSld>
@@ -3641,7 +3640,7 @@
     </p:spTree>
     <p:extLst>
       <p:ext uri="{BB962C8B-B14F-4D97-AF65-F5344CB8AC3E}">
-        <p14:creationId xmlns:p14="http://schemas.microsoft.com/office/powerpoint/2010/main" val="2277390628"/>
+        <p14:creationId xmlns:p14="http://schemas.microsoft.com/office/powerpoint/2010/main" xmlns="" val="2277390628"/>
       </p:ext>
     </p:extLst>
   </p:cSld>
@@ -3833,7 +3832,7 @@
     </p:spTree>
     <p:extLst>
       <p:ext uri="{BB962C8B-B14F-4D97-AF65-F5344CB8AC3E}">
-        <p14:creationId xmlns:p14="http://schemas.microsoft.com/office/powerpoint/2010/main" val="2514542716"/>
+        <p14:creationId xmlns:p14="http://schemas.microsoft.com/office/powerpoint/2010/main" xmlns="" val="2514542716"/>
       </p:ext>
     </p:extLst>
   </p:cSld>
@@ -4035,7 +4034,7 @@
     </p:spTree>
     <p:extLst>
       <p:ext uri="{BB962C8B-B14F-4D97-AF65-F5344CB8AC3E}">
-        <p14:creationId xmlns:p14="http://schemas.microsoft.com/office/powerpoint/2010/main" val="510430010"/>
+        <p14:creationId xmlns:p14="http://schemas.microsoft.com/office/powerpoint/2010/main" xmlns="" val="510430010"/>
       </p:ext>
     </p:extLst>
   </p:cSld>
@@ -4334,7 +4333,7 @@
     </p:spTree>
     <p:extLst>
       <p:ext uri="{BB962C8B-B14F-4D97-AF65-F5344CB8AC3E}">
-        <p14:creationId xmlns:p14="http://schemas.microsoft.com/office/powerpoint/2010/main" val="785146755"/>
+        <p14:creationId xmlns:p14="http://schemas.microsoft.com/office/powerpoint/2010/main" xmlns="" val="785146755"/>
       </p:ext>
     </p:extLst>
   </p:cSld>
@@ -4548,7 +4547,7 @@
     </p:spTree>
     <p:extLst>
       <p:ext uri="{BB962C8B-B14F-4D97-AF65-F5344CB8AC3E}">
-        <p14:creationId xmlns:p14="http://schemas.microsoft.com/office/powerpoint/2010/main" val="2166623876"/>
+        <p14:creationId xmlns:p14="http://schemas.microsoft.com/office/powerpoint/2010/main" xmlns="" val="2166623876"/>
       </p:ext>
     </p:extLst>
   </p:cSld>
@@ -4858,7 +4857,7 @@
     </p:spTree>
     <p:extLst>
       <p:ext uri="{BB962C8B-B14F-4D97-AF65-F5344CB8AC3E}">
-        <p14:creationId xmlns:p14="http://schemas.microsoft.com/office/powerpoint/2010/main" val="736608874"/>
+        <p14:creationId xmlns:p14="http://schemas.microsoft.com/office/powerpoint/2010/main" xmlns="" val="736608874"/>
       </p:ext>
     </p:extLst>
   </p:cSld>
@@ -5307,7 +5306,7 @@
     </p:spTree>
     <p:extLst>
       <p:ext uri="{BB962C8B-B14F-4D97-AF65-F5344CB8AC3E}">
-        <p14:creationId xmlns:p14="http://schemas.microsoft.com/office/powerpoint/2010/main" val="2284628605"/>
+        <p14:creationId xmlns:p14="http://schemas.microsoft.com/office/powerpoint/2010/main" xmlns="" val="2284628605"/>
       </p:ext>
     </p:extLst>
   </p:cSld>
@@ -5447,7 +5446,7 @@
     </p:spTree>
     <p:extLst>
       <p:ext uri="{BB962C8B-B14F-4D97-AF65-F5344CB8AC3E}">
-        <p14:creationId xmlns:p14="http://schemas.microsoft.com/office/powerpoint/2010/main" val="1230267363"/>
+        <p14:creationId xmlns:p14="http://schemas.microsoft.com/office/powerpoint/2010/main" xmlns="" val="1230267363"/>
       </p:ext>
     </p:extLst>
   </p:cSld>
@@ -5564,7 +5563,7 @@
     </p:spTree>
     <p:extLst>
       <p:ext uri="{BB962C8B-B14F-4D97-AF65-F5344CB8AC3E}">
-        <p14:creationId xmlns:p14="http://schemas.microsoft.com/office/powerpoint/2010/main" val="1073760290"/>
+        <p14:creationId xmlns:p14="http://schemas.microsoft.com/office/powerpoint/2010/main" xmlns="" val="1073760290"/>
       </p:ext>
     </p:extLst>
   </p:cSld>
@@ -5778,7 +5777,7 @@
     </p:spTree>
     <p:extLst>
       <p:ext uri="{BB962C8B-B14F-4D97-AF65-F5344CB8AC3E}">
-        <p14:creationId xmlns:p14="http://schemas.microsoft.com/office/powerpoint/2010/main" val="3880213393"/>
+        <p14:creationId xmlns:p14="http://schemas.microsoft.com/office/powerpoint/2010/main" xmlns="" val="3880213393"/>
       </p:ext>
     </p:extLst>
   </p:cSld>
@@ -6077,7 +6076,7 @@
     </p:spTree>
     <p:extLst>
       <p:ext uri="{BB962C8B-B14F-4D97-AF65-F5344CB8AC3E}">
-        <p14:creationId xmlns:p14="http://schemas.microsoft.com/office/powerpoint/2010/main" val="2582652156"/>
+        <p14:creationId xmlns:p14="http://schemas.microsoft.com/office/powerpoint/2010/main" xmlns="" val="2582652156"/>
       </p:ext>
     </p:extLst>
   </p:cSld>
@@ -6352,7 +6351,7 @@
     </p:spTree>
     <p:extLst>
       <p:ext uri="{BB962C8B-B14F-4D97-AF65-F5344CB8AC3E}">
-        <p14:creationId xmlns:p14="http://schemas.microsoft.com/office/powerpoint/2010/main" val="2073530966"/>
+        <p14:creationId xmlns:p14="http://schemas.microsoft.com/office/powerpoint/2010/main" xmlns="" val="2073530966"/>
       </p:ext>
     </p:extLst>
   </p:cSld>
@@ -6544,7 +6543,7 @@
     </p:spTree>
     <p:extLst>
       <p:ext uri="{BB962C8B-B14F-4D97-AF65-F5344CB8AC3E}">
-        <p14:creationId xmlns:p14="http://schemas.microsoft.com/office/powerpoint/2010/main" val="2545962705"/>
+        <p14:creationId xmlns:p14="http://schemas.microsoft.com/office/powerpoint/2010/main" xmlns="" val="2545962705"/>
       </p:ext>
     </p:extLst>
   </p:cSld>
@@ -6746,7 +6745,7 @@
     </p:spTree>
     <p:extLst>
       <p:ext uri="{BB962C8B-B14F-4D97-AF65-F5344CB8AC3E}">
-        <p14:creationId xmlns:p14="http://schemas.microsoft.com/office/powerpoint/2010/main" val="226266198"/>
+        <p14:creationId xmlns:p14="http://schemas.microsoft.com/office/powerpoint/2010/main" xmlns="" val="226266198"/>
       </p:ext>
     </p:extLst>
   </p:cSld>
@@ -7056,7 +7055,7 @@
     </p:spTree>
     <p:extLst>
       <p:ext uri="{BB962C8B-B14F-4D97-AF65-F5344CB8AC3E}">
-        <p14:creationId xmlns:p14="http://schemas.microsoft.com/office/powerpoint/2010/main" val="3309487713"/>
+        <p14:creationId xmlns:p14="http://schemas.microsoft.com/office/powerpoint/2010/main" xmlns="" val="3309487713"/>
       </p:ext>
     </p:extLst>
   </p:cSld>
@@ -7505,7 +7504,7 @@
     </p:spTree>
     <p:extLst>
       <p:ext uri="{BB962C8B-B14F-4D97-AF65-F5344CB8AC3E}">
-        <p14:creationId xmlns:p14="http://schemas.microsoft.com/office/powerpoint/2010/main" val="3062998403"/>
+        <p14:creationId xmlns:p14="http://schemas.microsoft.com/office/powerpoint/2010/main" xmlns="" val="3062998403"/>
       </p:ext>
     </p:extLst>
   </p:cSld>
@@ -7645,7 +7644,7 @@
     </p:spTree>
     <p:extLst>
       <p:ext uri="{BB962C8B-B14F-4D97-AF65-F5344CB8AC3E}">
-        <p14:creationId xmlns:p14="http://schemas.microsoft.com/office/powerpoint/2010/main" val="4287964921"/>
+        <p14:creationId xmlns:p14="http://schemas.microsoft.com/office/powerpoint/2010/main" xmlns="" val="4287964921"/>
       </p:ext>
     </p:extLst>
   </p:cSld>
@@ -7762,7 +7761,7 @@
     </p:spTree>
     <p:extLst>
       <p:ext uri="{BB962C8B-B14F-4D97-AF65-F5344CB8AC3E}">
-        <p14:creationId xmlns:p14="http://schemas.microsoft.com/office/powerpoint/2010/main" val="4240990639"/>
+        <p14:creationId xmlns:p14="http://schemas.microsoft.com/office/powerpoint/2010/main" xmlns="" val="4240990639"/>
       </p:ext>
     </p:extLst>
   </p:cSld>
@@ -8061,7 +8060,7 @@
     </p:spTree>
     <p:extLst>
       <p:ext uri="{BB962C8B-B14F-4D97-AF65-F5344CB8AC3E}">
-        <p14:creationId xmlns:p14="http://schemas.microsoft.com/office/powerpoint/2010/main" val="4056290413"/>
+        <p14:creationId xmlns:p14="http://schemas.microsoft.com/office/powerpoint/2010/main" xmlns="" val="4056290413"/>
       </p:ext>
     </p:extLst>
   </p:cSld>
@@ -8340,7 +8339,7 @@
     </p:spTree>
     <p:extLst>
       <p:ext uri="{BB962C8B-B14F-4D97-AF65-F5344CB8AC3E}">
-        <p14:creationId xmlns:p14="http://schemas.microsoft.com/office/powerpoint/2010/main" val="100683316"/>
+        <p14:creationId xmlns:p14="http://schemas.microsoft.com/office/powerpoint/2010/main" xmlns="" val="100683316"/>
       </p:ext>
     </p:extLst>
   </p:cSld>
@@ -8387,7 +8386,7 @@
           <a:blip r:embed="rId13" cstate="print">
             <a:extLst>
               <a:ext uri="{28A0092B-C50C-407E-A947-70E740481C1C}">
-                <a14:useLocalDpi xmlns:a14="http://schemas.microsoft.com/office/drawing/2010/main" val="0"/>
+                <a14:useLocalDpi xmlns:a14="http://schemas.microsoft.com/office/drawing/2010/main" xmlns="" val="0"/>
               </a:ext>
             </a:extLst>
           </a:blip>
@@ -8407,7 +8406,7 @@
           <a:noFill/>
           <a:extLst>
             <a:ext uri="{909E8E84-426E-40DD-AFC4-6F175D3DCCD1}">
-              <a14:hiddenFill xmlns:a14="http://schemas.microsoft.com/office/drawing/2010/main">
+              <a14:hiddenFill xmlns:a14="http://schemas.microsoft.com/office/drawing/2010/main" xmlns="">
                 <a:solidFill>
                   <a:srgbClr val="FFFFFF"/>
                 </a:solidFill>
@@ -8441,14 +8440,14 @@
           <a:effectLst/>
           <a:extLst>
             <a:ext uri="{909E8E84-426E-40DD-AFC4-6F175D3DCCD1}">
-              <a14:hiddenFill xmlns:a14="http://schemas.microsoft.com/office/drawing/2010/main">
+              <a14:hiddenFill xmlns:a14="http://schemas.microsoft.com/office/drawing/2010/main" xmlns="">
                 <a:solidFill>
                   <a:schemeClr val="accent1"/>
                 </a:solidFill>
               </a14:hiddenFill>
             </a:ext>
             <a:ext uri="{91240B29-F687-4F45-9708-019B960494DF}">
-              <a14:hiddenLine xmlns:a14="http://schemas.microsoft.com/office/drawing/2010/main" w="9525">
+              <a14:hiddenLine xmlns:a14="http://schemas.microsoft.com/office/drawing/2010/main" xmlns="" w="9525">
                 <a:solidFill>
                   <a:schemeClr val="tx1"/>
                 </a:solidFill>
@@ -8458,7 +8457,7 @@
               </a14:hiddenLine>
             </a:ext>
             <a:ext uri="{AF507438-7753-43E0-B8FC-AC1667EBCBE1}">
-              <a14:hiddenEffects xmlns:a14="http://schemas.microsoft.com/office/drawing/2010/main">
+              <a14:hiddenEffects xmlns:a14="http://schemas.microsoft.com/office/drawing/2010/main" xmlns="">
                 <a:effectLst>
                   <a:outerShdw dist="35921" dir="2700000" algn="ctr" rotWithShape="0">
                     <a:schemeClr val="bg2"/>
@@ -8510,14 +8509,14 @@
           <a:effectLst/>
           <a:extLst>
             <a:ext uri="{909E8E84-426E-40DD-AFC4-6F175D3DCCD1}">
-              <a14:hiddenFill xmlns:a14="http://schemas.microsoft.com/office/drawing/2010/main">
+              <a14:hiddenFill xmlns:a14="http://schemas.microsoft.com/office/drawing/2010/main" xmlns="">
                 <a:solidFill>
                   <a:schemeClr val="accent1"/>
                 </a:solidFill>
               </a14:hiddenFill>
             </a:ext>
             <a:ext uri="{91240B29-F687-4F45-9708-019B960494DF}">
-              <a14:hiddenLine xmlns:a14="http://schemas.microsoft.com/office/drawing/2010/main" w="9525">
+              <a14:hiddenLine xmlns:a14="http://schemas.microsoft.com/office/drawing/2010/main" xmlns="" w="9525">
                 <a:solidFill>
                   <a:schemeClr val="tx1"/>
                 </a:solidFill>
@@ -8527,7 +8526,7 @@
               </a14:hiddenLine>
             </a:ext>
             <a:ext uri="{AF507438-7753-43E0-B8FC-AC1667EBCBE1}">
-              <a14:hiddenEffects xmlns:a14="http://schemas.microsoft.com/office/drawing/2010/main">
+              <a14:hiddenEffects xmlns:a14="http://schemas.microsoft.com/office/drawing/2010/main" xmlns="">
                 <a:effectLst>
                   <a:outerShdw dist="35921" dir="2700000" algn="ctr" rotWithShape="0">
                     <a:schemeClr val="bg2"/>
@@ -8569,7 +8568,7 @@
           <a:blip r:embed="rId14" cstate="print">
             <a:extLst>
               <a:ext uri="{28A0092B-C50C-407E-A947-70E740481C1C}">
-                <a14:useLocalDpi xmlns:a14="http://schemas.microsoft.com/office/drawing/2010/main" val="0"/>
+                <a14:useLocalDpi xmlns:a14="http://schemas.microsoft.com/office/drawing/2010/main" xmlns="" val="0"/>
               </a:ext>
             </a:extLst>
           </a:blip>
@@ -8589,7 +8588,7 @@
           <a:noFill/>
           <a:extLst>
             <a:ext uri="{909E8E84-426E-40DD-AFC4-6F175D3DCCD1}">
-              <a14:hiddenFill xmlns:a14="http://schemas.microsoft.com/office/drawing/2010/main">
+              <a14:hiddenFill xmlns:a14="http://schemas.microsoft.com/office/drawing/2010/main" xmlns="">
                 <a:solidFill>
                   <a:srgbClr val="FFFFFF"/>
                 </a:solidFill>
@@ -8623,14 +8622,14 @@
           <a:effectLst/>
           <a:extLst>
             <a:ext uri="{909E8E84-426E-40DD-AFC4-6F175D3DCCD1}">
-              <a14:hiddenFill xmlns:a14="http://schemas.microsoft.com/office/drawing/2010/main">
+              <a14:hiddenFill xmlns:a14="http://schemas.microsoft.com/office/drawing/2010/main" xmlns="">
                 <a:solidFill>
                   <a:schemeClr val="accent1"/>
                 </a:solidFill>
               </a14:hiddenFill>
             </a:ext>
             <a:ext uri="{91240B29-F687-4F45-9708-019B960494DF}">
-              <a14:hiddenLine xmlns:a14="http://schemas.microsoft.com/office/drawing/2010/main" w="9525">
+              <a14:hiddenLine xmlns:a14="http://schemas.microsoft.com/office/drawing/2010/main" xmlns="" w="9525">
                 <a:solidFill>
                   <a:schemeClr val="tx1"/>
                 </a:solidFill>
@@ -8640,7 +8639,7 @@
               </a14:hiddenLine>
             </a:ext>
             <a:ext uri="{AF507438-7753-43E0-B8FC-AC1667EBCBE1}">
-              <a14:hiddenEffects xmlns:a14="http://schemas.microsoft.com/office/drawing/2010/main">
+              <a14:hiddenEffects xmlns:a14="http://schemas.microsoft.com/office/drawing/2010/main" xmlns="">
                 <a:effectLst>
                   <a:outerShdw dist="35921" dir="2700000" algn="ctr" rotWithShape="0">
                     <a:schemeClr val="bg2"/>
@@ -8691,7 +8690,7 @@
           <a:blip r:embed="rId15" cstate="print">
             <a:extLst>
               <a:ext uri="{28A0092B-C50C-407E-A947-70E740481C1C}">
-                <a14:useLocalDpi xmlns:a14="http://schemas.microsoft.com/office/drawing/2010/main" val="0"/>
+                <a14:useLocalDpi xmlns:a14="http://schemas.microsoft.com/office/drawing/2010/main" xmlns="" val="0"/>
               </a:ext>
             </a:extLst>
           </a:blip>
@@ -8711,7 +8710,7 @@
           <a:noFill/>
           <a:extLst>
             <a:ext uri="{909E8E84-426E-40DD-AFC4-6F175D3DCCD1}">
-              <a14:hiddenFill xmlns:a14="http://schemas.microsoft.com/office/drawing/2010/main">
+              <a14:hiddenFill xmlns:a14="http://schemas.microsoft.com/office/drawing/2010/main" xmlns="">
                 <a:solidFill>
                   <a:srgbClr val="FFFFFF"/>
                 </a:solidFill>
@@ -8745,14 +8744,14 @@
           <a:effectLst/>
           <a:extLst>
             <a:ext uri="{909E8E84-426E-40DD-AFC4-6F175D3DCCD1}">
-              <a14:hiddenFill xmlns:a14="http://schemas.microsoft.com/office/drawing/2010/main">
+              <a14:hiddenFill xmlns:a14="http://schemas.microsoft.com/office/drawing/2010/main" xmlns="">
                 <a:solidFill>
                   <a:schemeClr val="accent1"/>
                 </a:solidFill>
               </a14:hiddenFill>
             </a:ext>
             <a:ext uri="{91240B29-F687-4F45-9708-019B960494DF}">
-              <a14:hiddenLine xmlns:a14="http://schemas.microsoft.com/office/drawing/2010/main" w="9525">
+              <a14:hiddenLine xmlns:a14="http://schemas.microsoft.com/office/drawing/2010/main" xmlns="" w="9525">
                 <a:solidFill>
                   <a:schemeClr val="tx1"/>
                 </a:solidFill>
@@ -8762,7 +8761,7 @@
               </a14:hiddenLine>
             </a:ext>
             <a:ext uri="{AF507438-7753-43E0-B8FC-AC1667EBCBE1}">
-              <a14:hiddenEffects xmlns:a14="http://schemas.microsoft.com/office/drawing/2010/main">
+              <a14:hiddenEffects xmlns:a14="http://schemas.microsoft.com/office/drawing/2010/main" xmlns="">
                 <a:effectLst>
                   <a:outerShdw dist="35921" dir="2700000" algn="ctr" rotWithShape="0">
                     <a:schemeClr val="bg2"/>
@@ -8822,14 +8821,14 @@
           <a:effectLst/>
           <a:extLst>
             <a:ext uri="{909E8E84-426E-40DD-AFC4-6F175D3DCCD1}">
-              <a14:hiddenFill xmlns:a14="http://schemas.microsoft.com/office/drawing/2010/main">
+              <a14:hiddenFill xmlns:a14="http://schemas.microsoft.com/office/drawing/2010/main" xmlns="">
                 <a:solidFill>
                   <a:schemeClr val="accent1"/>
                 </a:solidFill>
               </a14:hiddenFill>
             </a:ext>
             <a:ext uri="{91240B29-F687-4F45-9708-019B960494DF}">
-              <a14:hiddenLine xmlns:a14="http://schemas.microsoft.com/office/drawing/2010/main" w="9525">
+              <a14:hiddenLine xmlns:a14="http://schemas.microsoft.com/office/drawing/2010/main" xmlns="" w="9525">
                 <a:solidFill>
                   <a:schemeClr val="tx1"/>
                 </a:solidFill>
@@ -8839,7 +8838,7 @@
               </a14:hiddenLine>
             </a:ext>
             <a:ext uri="{AF507438-7753-43E0-B8FC-AC1667EBCBE1}">
-              <a14:hiddenEffects xmlns:a14="http://schemas.microsoft.com/office/drawing/2010/main">
+              <a14:hiddenEffects xmlns:a14="http://schemas.microsoft.com/office/drawing/2010/main" xmlns="">
                 <a:effectLst>
                   <a:outerShdw dist="35921" dir="2700000" algn="ctr" rotWithShape="0">
                     <a:schemeClr val="bg2"/>
@@ -9351,7 +9350,7 @@
           <a:blip r:embed="rId13" cstate="print">
             <a:extLst>
               <a:ext uri="{28A0092B-C50C-407E-A947-70E740481C1C}">
-                <a14:useLocalDpi xmlns:a14="http://schemas.microsoft.com/office/drawing/2010/main" val="0"/>
+                <a14:useLocalDpi xmlns:a14="http://schemas.microsoft.com/office/drawing/2010/main" xmlns="" val="0"/>
               </a:ext>
             </a:extLst>
           </a:blip>
@@ -9371,7 +9370,7 @@
           <a:noFill/>
           <a:extLst>
             <a:ext uri="{909E8E84-426E-40DD-AFC4-6F175D3DCCD1}">
-              <a14:hiddenFill xmlns:a14="http://schemas.microsoft.com/office/drawing/2010/main">
+              <a14:hiddenFill xmlns:a14="http://schemas.microsoft.com/office/drawing/2010/main" xmlns="">
                 <a:solidFill>
                   <a:srgbClr val="FFFFFF"/>
                 </a:solidFill>
@@ -9392,7 +9391,7 @@
           <a:blip r:embed="rId14" cstate="print">
             <a:extLst>
               <a:ext uri="{28A0092B-C50C-407E-A947-70E740481C1C}">
-                <a14:useLocalDpi xmlns:a14="http://schemas.microsoft.com/office/drawing/2010/main" val="0"/>
+                <a14:useLocalDpi xmlns:a14="http://schemas.microsoft.com/office/drawing/2010/main" xmlns="" val="0"/>
               </a:ext>
             </a:extLst>
           </a:blip>
@@ -9412,7 +9411,7 @@
           <a:noFill/>
           <a:extLst>
             <a:ext uri="{909E8E84-426E-40DD-AFC4-6F175D3DCCD1}">
-              <a14:hiddenFill xmlns:a14="http://schemas.microsoft.com/office/drawing/2010/main">
+              <a14:hiddenFill xmlns:a14="http://schemas.microsoft.com/office/drawing/2010/main" xmlns="">
                 <a:solidFill>
                   <a:srgbClr val="FFFFFF"/>
                 </a:solidFill>
@@ -9446,14 +9445,14 @@
           <a:effectLst/>
           <a:extLst>
             <a:ext uri="{909E8E84-426E-40DD-AFC4-6F175D3DCCD1}">
-              <a14:hiddenFill xmlns:a14="http://schemas.microsoft.com/office/drawing/2010/main">
+              <a14:hiddenFill xmlns:a14="http://schemas.microsoft.com/office/drawing/2010/main" xmlns="">
                 <a:solidFill>
                   <a:schemeClr val="accent1"/>
                 </a:solidFill>
               </a14:hiddenFill>
             </a:ext>
             <a:ext uri="{91240B29-F687-4F45-9708-019B960494DF}">
-              <a14:hiddenLine xmlns:a14="http://schemas.microsoft.com/office/drawing/2010/main" w="9525">
+              <a14:hiddenLine xmlns:a14="http://schemas.microsoft.com/office/drawing/2010/main" xmlns="" w="9525">
                 <a:solidFill>
                   <a:schemeClr val="tx1"/>
                 </a:solidFill>
@@ -9463,7 +9462,7 @@
               </a14:hiddenLine>
             </a:ext>
             <a:ext uri="{AF507438-7753-43E0-B8FC-AC1667EBCBE1}">
-              <a14:hiddenEffects xmlns:a14="http://schemas.microsoft.com/office/drawing/2010/main">
+              <a14:hiddenEffects xmlns:a14="http://schemas.microsoft.com/office/drawing/2010/main" xmlns="">
                 <a:effectLst>
                   <a:outerShdw dist="35921" dir="2700000" algn="ctr" rotWithShape="0">
                     <a:schemeClr val="bg2"/>
@@ -9514,14 +9513,14 @@
           <a:effectLst/>
           <a:extLst>
             <a:ext uri="{909E8E84-426E-40DD-AFC4-6F175D3DCCD1}">
-              <a14:hiddenFill xmlns:a14="http://schemas.microsoft.com/office/drawing/2010/main">
+              <a14:hiddenFill xmlns:a14="http://schemas.microsoft.com/office/drawing/2010/main" xmlns="">
                 <a:solidFill>
                   <a:schemeClr val="accent1"/>
                 </a:solidFill>
               </a14:hiddenFill>
             </a:ext>
             <a:ext uri="{91240B29-F687-4F45-9708-019B960494DF}">
-              <a14:hiddenLine xmlns:a14="http://schemas.microsoft.com/office/drawing/2010/main" w="9525">
+              <a14:hiddenLine xmlns:a14="http://schemas.microsoft.com/office/drawing/2010/main" xmlns="" w="9525">
                 <a:solidFill>
                   <a:schemeClr val="tx1"/>
                 </a:solidFill>
@@ -9531,7 +9530,7 @@
               </a14:hiddenLine>
             </a:ext>
             <a:ext uri="{AF507438-7753-43E0-B8FC-AC1667EBCBE1}">
-              <a14:hiddenEffects xmlns:a14="http://schemas.microsoft.com/office/drawing/2010/main">
+              <a14:hiddenEffects xmlns:a14="http://schemas.microsoft.com/office/drawing/2010/main" xmlns="">
                 <a:effectLst>
                   <a:outerShdw dist="35921" dir="2700000" algn="ctr" rotWithShape="0">
                     <a:schemeClr val="bg2"/>
@@ -9586,14 +9585,14 @@
           <a:effectLst/>
           <a:extLst>
             <a:ext uri="{909E8E84-426E-40DD-AFC4-6F175D3DCCD1}">
-              <a14:hiddenFill xmlns:a14="http://schemas.microsoft.com/office/drawing/2010/main">
+              <a14:hiddenFill xmlns:a14="http://schemas.microsoft.com/office/drawing/2010/main" xmlns="">
                 <a:solidFill>
                   <a:schemeClr val="accent1"/>
                 </a:solidFill>
               </a14:hiddenFill>
             </a:ext>
             <a:ext uri="{91240B29-F687-4F45-9708-019B960494DF}">
-              <a14:hiddenLine xmlns:a14="http://schemas.microsoft.com/office/drawing/2010/main" w="9525">
+              <a14:hiddenLine xmlns:a14="http://schemas.microsoft.com/office/drawing/2010/main" xmlns="" w="9525">
                 <a:solidFill>
                   <a:schemeClr val="tx1"/>
                 </a:solidFill>
@@ -9603,7 +9602,7 @@
               </a14:hiddenLine>
             </a:ext>
             <a:ext uri="{AF507438-7753-43E0-B8FC-AC1667EBCBE1}">
-              <a14:hiddenEffects xmlns:a14="http://schemas.microsoft.com/office/drawing/2010/main">
+              <a14:hiddenEffects xmlns:a14="http://schemas.microsoft.com/office/drawing/2010/main" xmlns="">
                 <a:effectLst>
                   <a:outerShdw dist="35921" dir="2700000" algn="ctr" rotWithShape="0">
                     <a:schemeClr val="bg2"/>
@@ -9654,7 +9653,7 @@
           <a:blip r:embed="rId15" cstate="print">
             <a:extLst>
               <a:ext uri="{28A0092B-C50C-407E-A947-70E740481C1C}">
-                <a14:useLocalDpi xmlns:a14="http://schemas.microsoft.com/office/drawing/2010/main" val="0"/>
+                <a14:useLocalDpi xmlns:a14="http://schemas.microsoft.com/office/drawing/2010/main" xmlns="" val="0"/>
               </a:ext>
             </a:extLst>
           </a:blip>
@@ -9674,7 +9673,7 @@
           <a:noFill/>
           <a:extLst>
             <a:ext uri="{909E8E84-426E-40DD-AFC4-6F175D3DCCD1}">
-              <a14:hiddenFill xmlns:a14="http://schemas.microsoft.com/office/drawing/2010/main">
+              <a14:hiddenFill xmlns:a14="http://schemas.microsoft.com/office/drawing/2010/main" xmlns="">
                 <a:solidFill>
                   <a:srgbClr val="FFFFFF"/>
                 </a:solidFill>
@@ -9708,14 +9707,14 @@
           <a:effectLst/>
           <a:extLst>
             <a:ext uri="{909E8E84-426E-40DD-AFC4-6F175D3DCCD1}">
-              <a14:hiddenFill xmlns:a14="http://schemas.microsoft.com/office/drawing/2010/main">
+              <a14:hiddenFill xmlns:a14="http://schemas.microsoft.com/office/drawing/2010/main" xmlns="">
                 <a:solidFill>
                   <a:schemeClr val="accent1"/>
                 </a:solidFill>
               </a14:hiddenFill>
             </a:ext>
             <a:ext uri="{91240B29-F687-4F45-9708-019B960494DF}">
-              <a14:hiddenLine xmlns:a14="http://schemas.microsoft.com/office/drawing/2010/main" w="9525">
+              <a14:hiddenLine xmlns:a14="http://schemas.microsoft.com/office/drawing/2010/main" xmlns="" w="9525">
                 <a:solidFill>
                   <a:schemeClr val="tx1"/>
                 </a:solidFill>
@@ -9725,7 +9724,7 @@
               </a14:hiddenLine>
             </a:ext>
             <a:ext uri="{AF507438-7753-43E0-B8FC-AC1667EBCBE1}">
-              <a14:hiddenEffects xmlns:a14="http://schemas.microsoft.com/office/drawing/2010/main">
+              <a14:hiddenEffects xmlns:a14="http://schemas.microsoft.com/office/drawing/2010/main" xmlns="">
                 <a:effectLst>
                   <a:outerShdw dist="35921" dir="2700000" algn="ctr" rotWithShape="0">
                     <a:schemeClr val="bg2"/>
@@ -9785,14 +9784,14 @@
           <a:effectLst/>
           <a:extLst>
             <a:ext uri="{909E8E84-426E-40DD-AFC4-6F175D3DCCD1}">
-              <a14:hiddenFill xmlns:a14="http://schemas.microsoft.com/office/drawing/2010/main">
+              <a14:hiddenFill xmlns:a14="http://schemas.microsoft.com/office/drawing/2010/main" xmlns="">
                 <a:solidFill>
                   <a:schemeClr val="accent1"/>
                 </a:solidFill>
               </a14:hiddenFill>
             </a:ext>
             <a:ext uri="{91240B29-F687-4F45-9708-019B960494DF}">
-              <a14:hiddenLine xmlns:a14="http://schemas.microsoft.com/office/drawing/2010/main" w="9525">
+              <a14:hiddenLine xmlns:a14="http://schemas.microsoft.com/office/drawing/2010/main" xmlns="" w="9525">
                 <a:solidFill>
                   <a:schemeClr val="tx1"/>
                 </a:solidFill>
@@ -9802,7 +9801,7 @@
               </a14:hiddenLine>
             </a:ext>
             <a:ext uri="{AF507438-7753-43E0-B8FC-AC1667EBCBE1}">
-              <a14:hiddenEffects xmlns:a14="http://schemas.microsoft.com/office/drawing/2010/main">
+              <a14:hiddenEffects xmlns:a14="http://schemas.microsoft.com/office/drawing/2010/main" xmlns="">
                 <a:effectLst>
                   <a:outerShdw dist="35921" dir="2700000" algn="ctr" rotWithShape="0">
                     <a:schemeClr val="bg2"/>
@@ -10313,7 +10312,7 @@
           <a:blip r:embed="rId13" cstate="print">
             <a:extLst>
               <a:ext uri="{28A0092B-C50C-407E-A947-70E740481C1C}">
-                <a14:useLocalDpi xmlns:a14="http://schemas.microsoft.com/office/drawing/2010/main" val="0"/>
+                <a14:useLocalDpi xmlns:a14="http://schemas.microsoft.com/office/drawing/2010/main" xmlns="" val="0"/>
               </a:ext>
             </a:extLst>
           </a:blip>
@@ -10333,7 +10332,7 @@
           <a:noFill/>
           <a:extLst>
             <a:ext uri="{909E8E84-426E-40DD-AFC4-6F175D3DCCD1}">
-              <a14:hiddenFill xmlns:a14="http://schemas.microsoft.com/office/drawing/2010/main">
+              <a14:hiddenFill xmlns:a14="http://schemas.microsoft.com/office/drawing/2010/main" xmlns="">
                 <a:solidFill>
                   <a:srgbClr val="FFFFFF"/>
                 </a:solidFill>
@@ -10354,7 +10353,7 @@
           <a:blip r:embed="rId14" cstate="print">
             <a:extLst>
               <a:ext uri="{28A0092B-C50C-407E-A947-70E740481C1C}">
-                <a14:useLocalDpi xmlns:a14="http://schemas.microsoft.com/office/drawing/2010/main" val="0"/>
+                <a14:useLocalDpi xmlns:a14="http://schemas.microsoft.com/office/drawing/2010/main" xmlns="" val="0"/>
               </a:ext>
             </a:extLst>
           </a:blip>
@@ -10374,7 +10373,7 @@
           <a:noFill/>
           <a:extLst>
             <a:ext uri="{909E8E84-426E-40DD-AFC4-6F175D3DCCD1}">
-              <a14:hiddenFill xmlns:a14="http://schemas.microsoft.com/office/drawing/2010/main">
+              <a14:hiddenFill xmlns:a14="http://schemas.microsoft.com/office/drawing/2010/main" xmlns="">
                 <a:solidFill>
                   <a:srgbClr val="FFFFFF"/>
                 </a:solidFill>
@@ -10408,14 +10407,14 @@
           <a:effectLst/>
           <a:extLst>
             <a:ext uri="{909E8E84-426E-40DD-AFC4-6F175D3DCCD1}">
-              <a14:hiddenFill xmlns:a14="http://schemas.microsoft.com/office/drawing/2010/main">
+              <a14:hiddenFill xmlns:a14="http://schemas.microsoft.com/office/drawing/2010/main" xmlns="">
                 <a:solidFill>
                   <a:schemeClr val="accent1"/>
                 </a:solidFill>
               </a14:hiddenFill>
             </a:ext>
             <a:ext uri="{91240B29-F687-4F45-9708-019B960494DF}">
-              <a14:hiddenLine xmlns:a14="http://schemas.microsoft.com/office/drawing/2010/main" w="9525">
+              <a14:hiddenLine xmlns:a14="http://schemas.microsoft.com/office/drawing/2010/main" xmlns="" w="9525">
                 <a:solidFill>
                   <a:schemeClr val="tx1"/>
                 </a:solidFill>
@@ -10425,7 +10424,7 @@
               </a14:hiddenLine>
             </a:ext>
             <a:ext uri="{AF507438-7753-43E0-B8FC-AC1667EBCBE1}">
-              <a14:hiddenEffects xmlns:a14="http://schemas.microsoft.com/office/drawing/2010/main">
+              <a14:hiddenEffects xmlns:a14="http://schemas.microsoft.com/office/drawing/2010/main" xmlns="">
                 <a:effectLst>
                   <a:outerShdw dist="35921" dir="2700000" algn="ctr" rotWithShape="0">
                     <a:schemeClr val="bg2"/>
@@ -10476,14 +10475,14 @@
           <a:effectLst/>
           <a:extLst>
             <a:ext uri="{909E8E84-426E-40DD-AFC4-6F175D3DCCD1}">
-              <a14:hiddenFill xmlns:a14="http://schemas.microsoft.com/office/drawing/2010/main">
+              <a14:hiddenFill xmlns:a14="http://schemas.microsoft.com/office/drawing/2010/main" xmlns="">
                 <a:solidFill>
                   <a:schemeClr val="accent1"/>
                 </a:solidFill>
               </a14:hiddenFill>
             </a:ext>
             <a:ext uri="{91240B29-F687-4F45-9708-019B960494DF}">
-              <a14:hiddenLine xmlns:a14="http://schemas.microsoft.com/office/drawing/2010/main" w="9525">
+              <a14:hiddenLine xmlns:a14="http://schemas.microsoft.com/office/drawing/2010/main" xmlns="" w="9525">
                 <a:solidFill>
                   <a:schemeClr val="tx1"/>
                 </a:solidFill>
@@ -10493,7 +10492,7 @@
               </a14:hiddenLine>
             </a:ext>
             <a:ext uri="{AF507438-7753-43E0-B8FC-AC1667EBCBE1}">
-              <a14:hiddenEffects xmlns:a14="http://schemas.microsoft.com/office/drawing/2010/main">
+              <a14:hiddenEffects xmlns:a14="http://schemas.microsoft.com/office/drawing/2010/main" xmlns="">
                 <a:effectLst>
                   <a:outerShdw dist="35921" dir="2700000" algn="ctr" rotWithShape="0">
                     <a:schemeClr val="bg2"/>
@@ -10548,14 +10547,14 @@
           <a:effectLst/>
           <a:extLst>
             <a:ext uri="{909E8E84-426E-40DD-AFC4-6F175D3DCCD1}">
-              <a14:hiddenFill xmlns:a14="http://schemas.microsoft.com/office/drawing/2010/main">
+              <a14:hiddenFill xmlns:a14="http://schemas.microsoft.com/office/drawing/2010/main" xmlns="">
                 <a:solidFill>
                   <a:schemeClr val="accent1"/>
                 </a:solidFill>
               </a14:hiddenFill>
             </a:ext>
             <a:ext uri="{91240B29-F687-4F45-9708-019B960494DF}">
-              <a14:hiddenLine xmlns:a14="http://schemas.microsoft.com/office/drawing/2010/main" w="9525">
+              <a14:hiddenLine xmlns:a14="http://schemas.microsoft.com/office/drawing/2010/main" xmlns="" w="9525">
                 <a:solidFill>
                   <a:schemeClr val="tx1"/>
                 </a:solidFill>
@@ -10565,7 +10564,7 @@
               </a14:hiddenLine>
             </a:ext>
             <a:ext uri="{AF507438-7753-43E0-B8FC-AC1667EBCBE1}">
-              <a14:hiddenEffects xmlns:a14="http://schemas.microsoft.com/office/drawing/2010/main">
+              <a14:hiddenEffects xmlns:a14="http://schemas.microsoft.com/office/drawing/2010/main" xmlns="">
                 <a:effectLst>
                   <a:outerShdw dist="35921" dir="2700000" algn="ctr" rotWithShape="0">
                     <a:schemeClr val="bg2"/>
@@ -10616,7 +10615,7 @@
           <a:blip r:embed="rId15" cstate="print">
             <a:extLst>
               <a:ext uri="{28A0092B-C50C-407E-A947-70E740481C1C}">
-                <a14:useLocalDpi xmlns:a14="http://schemas.microsoft.com/office/drawing/2010/main" val="0"/>
+                <a14:useLocalDpi xmlns:a14="http://schemas.microsoft.com/office/drawing/2010/main" xmlns="" val="0"/>
               </a:ext>
             </a:extLst>
           </a:blip>
@@ -10636,7 +10635,7 @@
           <a:noFill/>
           <a:extLst>
             <a:ext uri="{909E8E84-426E-40DD-AFC4-6F175D3DCCD1}">
-              <a14:hiddenFill xmlns:a14="http://schemas.microsoft.com/office/drawing/2010/main">
+              <a14:hiddenFill xmlns:a14="http://schemas.microsoft.com/office/drawing/2010/main" xmlns="">
                 <a:solidFill>
                   <a:srgbClr val="FFFFFF"/>
                 </a:solidFill>
@@ -10670,14 +10669,14 @@
           <a:effectLst/>
           <a:extLst>
             <a:ext uri="{909E8E84-426E-40DD-AFC4-6F175D3DCCD1}">
-              <a14:hiddenFill xmlns:a14="http://schemas.microsoft.com/office/drawing/2010/main">
+              <a14:hiddenFill xmlns:a14="http://schemas.microsoft.com/office/drawing/2010/main" xmlns="">
                 <a:solidFill>
                   <a:schemeClr val="accent1"/>
                 </a:solidFill>
               </a14:hiddenFill>
             </a:ext>
             <a:ext uri="{91240B29-F687-4F45-9708-019B960494DF}">
-              <a14:hiddenLine xmlns:a14="http://schemas.microsoft.com/office/drawing/2010/main" w="9525">
+              <a14:hiddenLine xmlns:a14="http://schemas.microsoft.com/office/drawing/2010/main" xmlns="" w="9525">
                 <a:solidFill>
                   <a:schemeClr val="tx1"/>
                 </a:solidFill>
@@ -10687,7 +10686,7 @@
               </a14:hiddenLine>
             </a:ext>
             <a:ext uri="{AF507438-7753-43E0-B8FC-AC1667EBCBE1}">
-              <a14:hiddenEffects xmlns:a14="http://schemas.microsoft.com/office/drawing/2010/main">
+              <a14:hiddenEffects xmlns:a14="http://schemas.microsoft.com/office/drawing/2010/main" xmlns="">
                 <a:effectLst>
                   <a:outerShdw dist="35921" dir="2700000" algn="ctr" rotWithShape="0">
                     <a:schemeClr val="bg2"/>
@@ -10747,14 +10746,14 @@
           <a:effectLst/>
           <a:extLst>
             <a:ext uri="{909E8E84-426E-40DD-AFC4-6F175D3DCCD1}">
-              <a14:hiddenFill xmlns:a14="http://schemas.microsoft.com/office/drawing/2010/main">
+              <a14:hiddenFill xmlns:a14="http://schemas.microsoft.com/office/drawing/2010/main" xmlns="">
                 <a:solidFill>
                   <a:schemeClr val="accent1"/>
                 </a:solidFill>
               </a14:hiddenFill>
             </a:ext>
             <a:ext uri="{91240B29-F687-4F45-9708-019B960494DF}">
-              <a14:hiddenLine xmlns:a14="http://schemas.microsoft.com/office/drawing/2010/main" w="9525">
+              <a14:hiddenLine xmlns:a14="http://schemas.microsoft.com/office/drawing/2010/main" xmlns="" w="9525">
                 <a:solidFill>
                   <a:schemeClr val="tx1"/>
                 </a:solidFill>
@@ -10764,7 +10763,7 @@
               </a14:hiddenLine>
             </a:ext>
             <a:ext uri="{AF507438-7753-43E0-B8FC-AC1667EBCBE1}">
-              <a14:hiddenEffects xmlns:a14="http://schemas.microsoft.com/office/drawing/2010/main">
+              <a14:hiddenEffects xmlns:a14="http://schemas.microsoft.com/office/drawing/2010/main" xmlns="">
                 <a:effectLst>
                   <a:outerShdw dist="35921" dir="2700000" algn="ctr" rotWithShape="0">
                     <a:schemeClr val="bg2"/>
@@ -11343,7 +11342,7 @@
     </p:spTree>
     <p:extLst>
       <p:ext uri="{BB962C8B-B14F-4D97-AF65-F5344CB8AC3E}">
-        <p14:creationId xmlns:p14="http://schemas.microsoft.com/office/powerpoint/2010/main" val="2480668044"/>
+        <p14:creationId xmlns:p14="http://schemas.microsoft.com/office/powerpoint/2010/main" xmlns="" val="2480668044"/>
       </p:ext>
     </p:extLst>
   </p:cSld>
@@ -11534,7 +11533,7 @@
     </p:spTree>
     <p:extLst>
       <p:ext uri="{BB962C8B-B14F-4D97-AF65-F5344CB8AC3E}">
-        <p14:creationId xmlns:p14="http://schemas.microsoft.com/office/powerpoint/2010/main" val="3504255483"/>
+        <p14:creationId xmlns:p14="http://schemas.microsoft.com/office/powerpoint/2010/main" xmlns="" val="3504255483"/>
       </p:ext>
     </p:extLst>
   </p:cSld>
@@ -11627,21 +11626,13 @@
             </a:r>
             <a:r>
               <a:rPr lang="nl-NL" dirty="0" smtClean="0"/>
-              <a:t>s </a:t>
-            </a:r>
+              <a:t>s since unix epoch</a:t>
+            </a:r>
+          </a:p>
+          <a:p>
             <a:r>
               <a:rPr lang="nl-NL" dirty="0" smtClean="0"/>
-              <a:t>since unix epoch</a:t>
-            </a:r>
-          </a:p>
-          <a:p>
-            <a:r>
-              <a:rPr lang="nl-NL" dirty="0" smtClean="0"/>
-              <a:t>Measure before and </a:t>
-            </a:r>
-            <a:r>
-              <a:rPr lang="nl-NL" dirty="0" smtClean="0"/>
-              <a:t>after</a:t>
+              <a:t>Measure before and after</a:t>
             </a:r>
           </a:p>
           <a:p>
@@ -11731,7 +11722,7 @@
     </p:spTree>
     <p:extLst>
       <p:ext uri="{BB962C8B-B14F-4D97-AF65-F5344CB8AC3E}">
-        <p14:creationId xmlns:p14="http://schemas.microsoft.com/office/powerpoint/2010/main" val="3649998688"/>
+        <p14:creationId xmlns:p14="http://schemas.microsoft.com/office/powerpoint/2010/main" xmlns="" val="3649998688"/>
       </p:ext>
     </p:extLst>
   </p:cSld>
@@ -11921,7 +11912,7 @@
     </p:spTree>
     <p:extLst>
       <p:ext uri="{BB962C8B-B14F-4D97-AF65-F5344CB8AC3E}">
-        <p14:creationId xmlns:p14="http://schemas.microsoft.com/office/powerpoint/2010/main" val="844478232"/>
+        <p14:creationId xmlns:p14="http://schemas.microsoft.com/office/powerpoint/2010/main" xmlns="" val="844478232"/>
       </p:ext>
     </p:extLst>
   </p:cSld>
@@ -11982,10 +11973,10 @@
           </p:nvPr>
         </p:nvPicPr>
         <p:blipFill>
-          <a:blip r:embed="rId2">
+          <a:blip r:embed="rId2" cstate="print">
             <a:extLst>
               <a:ext uri="{28A0092B-C50C-407E-A947-70E740481C1C}">
-                <a14:useLocalDpi xmlns:a14="http://schemas.microsoft.com/office/drawing/2010/main" val="0"/>
+                <a14:useLocalDpi xmlns:a14="http://schemas.microsoft.com/office/drawing/2010/main" xmlns="" val="0"/>
               </a:ext>
             </a:extLst>
           </a:blip>
@@ -12086,10 +12077,10 @@
           </p:nvPr>
         </p:nvPicPr>
         <p:blipFill>
-          <a:blip r:embed="rId3">
+          <a:blip r:embed="rId3" cstate="print">
             <a:extLst>
               <a:ext uri="{28A0092B-C50C-407E-A947-70E740481C1C}">
-                <a14:useLocalDpi xmlns:a14="http://schemas.microsoft.com/office/drawing/2010/main" val="0"/>
+                <a14:useLocalDpi xmlns:a14="http://schemas.microsoft.com/office/drawing/2010/main" xmlns="" val="0"/>
               </a:ext>
             </a:extLst>
           </a:blip>
@@ -12107,7 +12098,7 @@
     </p:spTree>
     <p:extLst>
       <p:ext uri="{BB962C8B-B14F-4D97-AF65-F5344CB8AC3E}">
-        <p14:creationId xmlns:p14="http://schemas.microsoft.com/office/powerpoint/2010/main" val="193362717"/>
+        <p14:creationId xmlns:p14="http://schemas.microsoft.com/office/powerpoint/2010/main" xmlns="" val="193362717"/>
       </p:ext>
     </p:extLst>
   </p:cSld>
@@ -12168,10 +12159,10 @@
           </p:nvPr>
         </p:nvPicPr>
         <p:blipFill>
-          <a:blip r:embed="rId2">
+          <a:blip r:embed="rId2" cstate="print">
             <a:extLst>
               <a:ext uri="{28A0092B-C50C-407E-A947-70E740481C1C}">
-                <a14:useLocalDpi xmlns:a14="http://schemas.microsoft.com/office/drawing/2010/main" val="0"/>
+                <a14:useLocalDpi xmlns:a14="http://schemas.microsoft.com/office/drawing/2010/main" xmlns="" val="0"/>
               </a:ext>
             </a:extLst>
           </a:blip>
@@ -12272,10 +12263,10 @@
           </p:nvPr>
         </p:nvPicPr>
         <p:blipFill>
-          <a:blip r:embed="rId3">
+          <a:blip r:embed="rId3" cstate="print">
             <a:extLst>
               <a:ext uri="{28A0092B-C50C-407E-A947-70E740481C1C}">
-                <a14:useLocalDpi xmlns:a14="http://schemas.microsoft.com/office/drawing/2010/main" val="0"/>
+                <a14:useLocalDpi xmlns:a14="http://schemas.microsoft.com/office/drawing/2010/main" xmlns="" val="0"/>
               </a:ext>
             </a:extLst>
           </a:blip>
@@ -12293,7 +12284,7 @@
     </p:spTree>
     <p:extLst>
       <p:ext uri="{BB962C8B-B14F-4D97-AF65-F5344CB8AC3E}">
-        <p14:creationId xmlns:p14="http://schemas.microsoft.com/office/powerpoint/2010/main" val="3753177398"/>
+        <p14:creationId xmlns:p14="http://schemas.microsoft.com/office/powerpoint/2010/main" xmlns="" val="3753177398"/>
       </p:ext>
     </p:extLst>
   </p:cSld>
@@ -12354,10 +12345,10 @@
           </p:nvPr>
         </p:nvPicPr>
         <p:blipFill>
-          <a:blip r:embed="rId2">
+          <a:blip r:embed="rId2" cstate="print">
             <a:extLst>
               <a:ext uri="{28A0092B-C50C-407E-A947-70E740481C1C}">
-                <a14:useLocalDpi xmlns:a14="http://schemas.microsoft.com/office/drawing/2010/main" val="0"/>
+                <a14:useLocalDpi xmlns:a14="http://schemas.microsoft.com/office/drawing/2010/main" xmlns="" val="0"/>
               </a:ext>
             </a:extLst>
           </a:blip>
@@ -12458,10 +12449,10 @@
           </p:nvPr>
         </p:nvPicPr>
         <p:blipFill>
-          <a:blip r:embed="rId3">
+          <a:blip r:embed="rId3" cstate="print">
             <a:extLst>
               <a:ext uri="{28A0092B-C50C-407E-A947-70E740481C1C}">
-                <a14:useLocalDpi xmlns:a14="http://schemas.microsoft.com/office/drawing/2010/main" val="0"/>
+                <a14:useLocalDpi xmlns:a14="http://schemas.microsoft.com/office/drawing/2010/main" xmlns="" val="0"/>
               </a:ext>
             </a:extLst>
           </a:blip>
@@ -12479,7 +12470,7 @@
     </p:spTree>
     <p:extLst>
       <p:ext uri="{BB962C8B-B14F-4D97-AF65-F5344CB8AC3E}">
-        <p14:creationId xmlns:p14="http://schemas.microsoft.com/office/powerpoint/2010/main" val="159973409"/>
+        <p14:creationId xmlns:p14="http://schemas.microsoft.com/office/powerpoint/2010/main" xmlns="" val="159973409"/>
       </p:ext>
     </p:extLst>
   </p:cSld>
@@ -12540,10 +12531,10 @@
           </p:nvPr>
         </p:nvPicPr>
         <p:blipFill>
-          <a:blip r:embed="rId2">
+          <a:blip r:embed="rId2" cstate="print">
             <a:extLst>
               <a:ext uri="{28A0092B-C50C-407E-A947-70E740481C1C}">
-                <a14:useLocalDpi xmlns:a14="http://schemas.microsoft.com/office/drawing/2010/main" val="0"/>
+                <a14:useLocalDpi xmlns:a14="http://schemas.microsoft.com/office/drawing/2010/main" xmlns="" val="0"/>
               </a:ext>
             </a:extLst>
           </a:blip>
@@ -12569,10 +12560,10 @@
           </p:nvPr>
         </p:nvPicPr>
         <p:blipFill>
-          <a:blip r:embed="rId3">
+          <a:blip r:embed="rId3" cstate="print">
             <a:extLst>
               <a:ext uri="{28A0092B-C50C-407E-A947-70E740481C1C}">
-                <a14:useLocalDpi xmlns:a14="http://schemas.microsoft.com/office/drawing/2010/main" val="0"/>
+                <a14:useLocalDpi xmlns:a14="http://schemas.microsoft.com/office/drawing/2010/main" xmlns="" val="0"/>
               </a:ext>
             </a:extLst>
           </a:blip>
@@ -12665,7 +12656,7 @@
     </p:spTree>
     <p:extLst>
       <p:ext uri="{BB962C8B-B14F-4D97-AF65-F5344CB8AC3E}">
-        <p14:creationId xmlns:p14="http://schemas.microsoft.com/office/powerpoint/2010/main" val="2965906798"/>
+        <p14:creationId xmlns:p14="http://schemas.microsoft.com/office/powerpoint/2010/main" xmlns="" val="2965906798"/>
       </p:ext>
     </p:extLst>
   </p:cSld>
@@ -12726,10 +12717,10 @@
           </p:nvPr>
         </p:nvPicPr>
         <p:blipFill>
-          <a:blip r:embed="rId2">
+          <a:blip r:embed="rId2" cstate="print">
             <a:extLst>
               <a:ext uri="{28A0092B-C50C-407E-A947-70E740481C1C}">
-                <a14:useLocalDpi xmlns:a14="http://schemas.microsoft.com/office/drawing/2010/main" val="0"/>
+                <a14:useLocalDpi xmlns:a14="http://schemas.microsoft.com/office/drawing/2010/main" xmlns="" val="0"/>
               </a:ext>
             </a:extLst>
           </a:blip>
@@ -12755,10 +12746,10 @@
           </p:nvPr>
         </p:nvPicPr>
         <p:blipFill>
-          <a:blip r:embed="rId3">
+          <a:blip r:embed="rId3" cstate="print">
             <a:extLst>
               <a:ext uri="{28A0092B-C50C-407E-A947-70E740481C1C}">
-                <a14:useLocalDpi xmlns:a14="http://schemas.microsoft.com/office/drawing/2010/main" val="0"/>
+                <a14:useLocalDpi xmlns:a14="http://schemas.microsoft.com/office/drawing/2010/main" xmlns="" val="0"/>
               </a:ext>
             </a:extLst>
           </a:blip>
@@ -12851,7 +12842,7 @@
     </p:spTree>
     <p:extLst>
       <p:ext uri="{BB962C8B-B14F-4D97-AF65-F5344CB8AC3E}">
-        <p14:creationId xmlns:p14="http://schemas.microsoft.com/office/powerpoint/2010/main" val="1660339234"/>
+        <p14:creationId xmlns:p14="http://schemas.microsoft.com/office/powerpoint/2010/main" xmlns="" val="1660339234"/>
       </p:ext>
     </p:extLst>
   </p:cSld>
@@ -12912,10 +12903,10 @@
           </p:nvPr>
         </p:nvPicPr>
         <p:blipFill>
-          <a:blip r:embed="rId2">
+          <a:blip r:embed="rId2" cstate="print">
             <a:extLst>
               <a:ext uri="{28A0092B-C50C-407E-A947-70E740481C1C}">
-                <a14:useLocalDpi xmlns:a14="http://schemas.microsoft.com/office/drawing/2010/main" val="0"/>
+                <a14:useLocalDpi xmlns:a14="http://schemas.microsoft.com/office/drawing/2010/main" xmlns="" val="0"/>
               </a:ext>
             </a:extLst>
           </a:blip>
@@ -12941,10 +12932,10 @@
           </p:nvPr>
         </p:nvPicPr>
         <p:blipFill>
-          <a:blip r:embed="rId3">
+          <a:blip r:embed="rId3" cstate="print">
             <a:extLst>
               <a:ext uri="{28A0092B-C50C-407E-A947-70E740481C1C}">
-                <a14:useLocalDpi xmlns:a14="http://schemas.microsoft.com/office/drawing/2010/main" val="0"/>
+                <a14:useLocalDpi xmlns:a14="http://schemas.microsoft.com/office/drawing/2010/main" xmlns="" val="0"/>
               </a:ext>
             </a:extLst>
           </a:blip>
@@ -13037,7 +13028,7 @@
     </p:spTree>
     <p:extLst>
       <p:ext uri="{BB962C8B-B14F-4D97-AF65-F5344CB8AC3E}">
-        <p14:creationId xmlns:p14="http://schemas.microsoft.com/office/powerpoint/2010/main" val="2730050800"/>
+        <p14:creationId xmlns:p14="http://schemas.microsoft.com/office/powerpoint/2010/main" xmlns="" val="2730050800"/>
       </p:ext>
     </p:extLst>
   </p:cSld>
@@ -13098,10 +13089,10 @@
           </p:nvPr>
         </p:nvPicPr>
         <p:blipFill>
-          <a:blip r:embed="rId2">
+          <a:blip r:embed="rId2" cstate="print">
             <a:extLst>
               <a:ext uri="{28A0092B-C50C-407E-A947-70E740481C1C}">
-                <a14:useLocalDpi xmlns:a14="http://schemas.microsoft.com/office/drawing/2010/main" val="0"/>
+                <a14:useLocalDpi xmlns:a14="http://schemas.microsoft.com/office/drawing/2010/main" xmlns="" val="0"/>
               </a:ext>
             </a:extLst>
           </a:blip>
@@ -13127,10 +13118,10 @@
           </p:nvPr>
         </p:nvPicPr>
         <p:blipFill>
-          <a:blip r:embed="rId3">
+          <a:blip r:embed="rId3" cstate="print">
             <a:extLst>
               <a:ext uri="{28A0092B-C50C-407E-A947-70E740481C1C}">
-                <a14:useLocalDpi xmlns:a14="http://schemas.microsoft.com/office/drawing/2010/main" val="0"/>
+                <a14:useLocalDpi xmlns:a14="http://schemas.microsoft.com/office/drawing/2010/main" xmlns="" val="0"/>
               </a:ext>
             </a:extLst>
           </a:blip>
@@ -13223,7 +13214,7 @@
     </p:spTree>
     <p:extLst>
       <p:ext uri="{BB962C8B-B14F-4D97-AF65-F5344CB8AC3E}">
-        <p14:creationId xmlns:p14="http://schemas.microsoft.com/office/powerpoint/2010/main" val="619382673"/>
+        <p14:creationId xmlns:p14="http://schemas.microsoft.com/office/powerpoint/2010/main" xmlns="" val="619382673"/>
       </p:ext>
     </p:extLst>
   </p:cSld>
@@ -13482,7 +13473,7 @@
           <a:blip r:embed="rId2" cstate="print">
             <a:extLst>
               <a:ext uri="{28A0092B-C50C-407E-A947-70E740481C1C}">
-                <a14:useLocalDpi xmlns:a14="http://schemas.microsoft.com/office/drawing/2010/main" val="0"/>
+                <a14:useLocalDpi xmlns:a14="http://schemas.microsoft.com/office/drawing/2010/main" xmlns="" val="0"/>
               </a:ext>
             </a:extLst>
           </a:blip>
@@ -13506,14 +13497,14 @@
           <a:effectLst/>
           <a:extLst>
             <a:ext uri="{909E8E84-426E-40DD-AFC4-6F175D3DCCD1}">
-              <a14:hiddenFill xmlns:a14="http://schemas.microsoft.com/office/drawing/2010/main">
+              <a14:hiddenFill xmlns:a14="http://schemas.microsoft.com/office/drawing/2010/main" xmlns="">
                 <a:solidFill>
                   <a:schemeClr val="accent1"/>
                 </a:solidFill>
               </a14:hiddenFill>
             </a:ext>
             <a:ext uri="{91240B29-F687-4F45-9708-019B960494DF}">
-              <a14:hiddenLine xmlns:a14="http://schemas.microsoft.com/office/drawing/2010/main" w="9525">
+              <a14:hiddenLine xmlns:a14="http://schemas.microsoft.com/office/drawing/2010/main" xmlns="" w="9525">
                 <a:solidFill>
                   <a:schemeClr val="tx1"/>
                 </a:solidFill>
@@ -13523,7 +13514,7 @@
               </a14:hiddenLine>
             </a:ext>
             <a:ext uri="{AF507438-7753-43E0-B8FC-AC1667EBCBE1}">
-              <a14:hiddenEffects xmlns:a14="http://schemas.microsoft.com/office/drawing/2010/main">
+              <a14:hiddenEffects xmlns:a14="http://schemas.microsoft.com/office/drawing/2010/main" xmlns="">
                 <a:effectLst>
                   <a:outerShdw dist="35921" dir="2700000" algn="ctr" rotWithShape="0">
                     <a:schemeClr val="bg2"/>
@@ -13537,7 +13528,7 @@
     </p:spTree>
     <p:extLst>
       <p:ext uri="{BB962C8B-B14F-4D97-AF65-F5344CB8AC3E}">
-        <p14:creationId xmlns:p14="http://schemas.microsoft.com/office/powerpoint/2010/main" val="262833968"/>
+        <p14:creationId xmlns:p14="http://schemas.microsoft.com/office/powerpoint/2010/main" xmlns="" val="262833968"/>
       </p:ext>
     </p:extLst>
   </p:cSld>
@@ -13581,63 +13572,12 @@
           <a:p>
             <a:r>
               <a:rPr lang="nl-NL" dirty="0" err="1" smtClean="0"/>
-              <a:t>Progress</a:t>
-            </a:r>
-            <a:endParaRPr lang="en-US" dirty="0"/>
-          </a:p>
-        </p:txBody>
-      </p:sp>
-      <p:sp>
-        <p:nvSpPr>
-          <p:cNvPr id="3" name="Content Placeholder 2"/>
-          <p:cNvSpPr>
-            <a:spLocks noGrp="1"/>
-          </p:cNvSpPr>
-          <p:nvPr>
-            <p:ph idx="1"/>
-          </p:nvPr>
-        </p:nvSpPr>
-        <p:spPr/>
-        <p:txBody>
-          <a:bodyPr/>
-          <a:lstStyle/>
-          <a:p>
+              <a:t>Questions</a:t>
+            </a:r>
             <a:r>
               <a:rPr lang="nl-NL" dirty="0" smtClean="0"/>
-              <a:t>A lot of data</a:t>
-            </a:r>
-          </a:p>
-          <a:p>
-            <a:endParaRPr lang="nl-NL" dirty="0"/>
-          </a:p>
-          <a:p>
-            <a:r>
-              <a:rPr lang="nl-NL" dirty="0" smtClean="0"/>
-              <a:t>Access </a:t>
-            </a:r>
-            <a:r>
-              <a:rPr lang="nl-NL" dirty="0" err="1" smtClean="0"/>
-              <a:t>to</a:t>
-            </a:r>
-            <a:r>
-              <a:rPr lang="nl-NL" dirty="0" smtClean="0"/>
-              <a:t> a lot of </a:t>
-            </a:r>
-            <a:r>
-              <a:rPr lang="nl-NL" dirty="0" err="1" smtClean="0"/>
-              <a:t>objects</a:t>
-            </a:r>
-            <a:r>
-              <a:rPr lang="nl-NL" dirty="0" smtClean="0"/>
-              <a:t> of host </a:t>
-            </a:r>
-            <a:r>
-              <a:rPr lang="nl-NL" dirty="0" err="1" smtClean="0"/>
-              <a:t>required</a:t>
-            </a:r>
-            <a:endParaRPr lang="nl-NL" dirty="0" smtClean="0"/>
-          </a:p>
-          <a:p>
+              <a:t>?</a:t>
+            </a:r>
             <a:endParaRPr lang="en-US" dirty="0"/>
           </a:p>
         </p:txBody>
@@ -13688,138 +13628,6 @@
               <a:rPr lang="nl-NL" smtClean="0"/>
               <a:pPr/>
               <a:t>19</a:t>
-            </a:fld>
-            <a:endParaRPr lang="nl-NL"/>
-          </a:p>
-        </p:txBody>
-      </p:sp>
-      <p:sp>
-        <p:nvSpPr>
-          <p:cNvPr id="6" name="Date Placeholder 5"/>
-          <p:cNvSpPr>
-            <a:spLocks noGrp="1"/>
-          </p:cNvSpPr>
-          <p:nvPr>
-            <p:ph type="dt" sz="half" idx="12"/>
-          </p:nvPr>
-        </p:nvSpPr>
-        <p:spPr/>
-        <p:txBody>
-          <a:bodyPr/>
-          <a:lstStyle/>
-          <a:p>
-            <a:fld id="{29387D58-1795-4544-9DBD-51E7675CBAA4}" type="datetime1">
-              <a:rPr lang="nl-NL" smtClean="0"/>
-              <a:pPr/>
-              <a:t>8-4-2014</a:t>
-            </a:fld>
-            <a:endParaRPr lang="nl-NL"/>
-          </a:p>
-        </p:txBody>
-      </p:sp>
-    </p:spTree>
-    <p:extLst>
-      <p:ext uri="{BB962C8B-B14F-4D97-AF65-F5344CB8AC3E}">
-        <p14:creationId xmlns:p14="http://schemas.microsoft.com/office/powerpoint/2010/main" val="1687566504"/>
-      </p:ext>
-    </p:extLst>
-  </p:cSld>
-  <p:clrMapOvr>
-    <a:masterClrMapping/>
-  </p:clrMapOvr>
-</p:sld>
-</file>
-
-<file path=ppt/slides/slide21.xml><?xml version="1.0" encoding="utf-8"?>
-<p:sld xmlns:a="http://schemas.openxmlformats.org/drawingml/2006/main" xmlns:r="http://schemas.openxmlformats.org/officeDocument/2006/relationships" xmlns:p="http://schemas.openxmlformats.org/presentationml/2006/main">
-  <p:cSld>
-    <p:spTree>
-      <p:nvGrpSpPr>
-        <p:cNvPr id="1" name=""/>
-        <p:cNvGrpSpPr/>
-        <p:nvPr/>
-      </p:nvGrpSpPr>
-      <p:grpSpPr>
-        <a:xfrm>
-          <a:off x="0" y="0"/>
-          <a:ext cx="0" cy="0"/>
-          <a:chOff x="0" y="0"/>
-          <a:chExt cx="0" cy="0"/>
-        </a:xfrm>
-      </p:grpSpPr>
-      <p:sp>
-        <p:nvSpPr>
-          <p:cNvPr id="2" name="Title 1"/>
-          <p:cNvSpPr>
-            <a:spLocks noGrp="1"/>
-          </p:cNvSpPr>
-          <p:nvPr>
-            <p:ph type="title"/>
-          </p:nvPr>
-        </p:nvSpPr>
-        <p:spPr/>
-        <p:txBody>
-          <a:bodyPr/>
-          <a:lstStyle/>
-          <a:p>
-            <a:r>
-              <a:rPr lang="nl-NL" dirty="0" err="1" smtClean="0"/>
-              <a:t>Questions</a:t>
-            </a:r>
-            <a:r>
-              <a:rPr lang="nl-NL" dirty="0" smtClean="0"/>
-              <a:t>?</a:t>
-            </a:r>
-            <a:endParaRPr lang="en-US" dirty="0"/>
-          </a:p>
-        </p:txBody>
-      </p:sp>
-      <p:sp>
-        <p:nvSpPr>
-          <p:cNvPr id="4" name="Footer Placeholder 3"/>
-          <p:cNvSpPr>
-            <a:spLocks noGrp="1"/>
-          </p:cNvSpPr>
-          <p:nvPr>
-            <p:ph type="ftr" sz="quarter" idx="10"/>
-          </p:nvPr>
-        </p:nvSpPr>
-        <p:spPr/>
-        <p:txBody>
-          <a:bodyPr/>
-          <a:lstStyle/>
-          <a:p>
-            <a:r>
-              <a:rPr lang="nl-NL" smtClean="0"/>
-              <a:t>Algorithms for Massive Data - Collision Detection using CUDA</a:t>
-            </a:r>
-            <a:endParaRPr lang="nl-NL"/>
-          </a:p>
-        </p:txBody>
-      </p:sp>
-      <p:sp>
-        <p:nvSpPr>
-          <p:cNvPr id="5" name="Slide Number Placeholder 4"/>
-          <p:cNvSpPr>
-            <a:spLocks noGrp="1"/>
-          </p:cNvSpPr>
-          <p:nvPr>
-            <p:ph type="sldNum" sz="quarter" idx="11"/>
-          </p:nvPr>
-        </p:nvSpPr>
-        <p:spPr/>
-        <p:txBody>
-          <a:bodyPr/>
-          <a:lstStyle/>
-          <a:p>
-            <a:r>
-              <a:rPr lang="nl-NL" smtClean="0"/>
-              <a:t>PAGE </a:t>
-            </a:r>
-            <a:fld id="{64507BF3-F534-45C0-83AD-04D6CE5339EE}" type="slidenum">
-              <a:rPr lang="nl-NL" smtClean="0"/>
-              <a:pPr/>
-              <a:t>20</a:t>
             </a:fld>
             <a:endParaRPr lang="nl-NL"/>
           </a:p>
@@ -13868,7 +13676,7 @@
           <a:noFill/>
           <a:extLst>
             <a:ext uri="{909E8E84-426E-40DD-AFC4-6F175D3DCCD1}">
-              <a14:hiddenFill xmlns:a14="http://schemas.microsoft.com/office/drawing/2010/main">
+              <a14:hiddenFill xmlns:a14="http://schemas.microsoft.com/office/drawing/2010/main" xmlns="">
                 <a:solidFill>
                   <a:srgbClr val="FFFFFF"/>
                 </a:solidFill>
@@ -13902,7 +13710,7 @@
           <a:blip r:embed="rId2" cstate="print">
             <a:extLst>
               <a:ext uri="{28A0092B-C50C-407E-A947-70E740481C1C}">
-                <a14:useLocalDpi xmlns:a14="http://schemas.microsoft.com/office/drawing/2010/main" val="0"/>
+                <a14:useLocalDpi xmlns:a14="http://schemas.microsoft.com/office/drawing/2010/main" xmlns="" val="0"/>
               </a:ext>
             </a:extLst>
           </a:blip>
@@ -13926,14 +13734,14 @@
           <a:effectLst/>
           <a:extLst>
             <a:ext uri="{909E8E84-426E-40DD-AFC4-6F175D3DCCD1}">
-              <a14:hiddenFill xmlns:a14="http://schemas.microsoft.com/office/drawing/2010/main">
+              <a14:hiddenFill xmlns:a14="http://schemas.microsoft.com/office/drawing/2010/main" xmlns="">
                 <a:solidFill>
                   <a:schemeClr val="accent1"/>
                 </a:solidFill>
               </a14:hiddenFill>
             </a:ext>
             <a:ext uri="{91240B29-F687-4F45-9708-019B960494DF}">
-              <a14:hiddenLine xmlns:a14="http://schemas.microsoft.com/office/drawing/2010/main" w="9525">
+              <a14:hiddenLine xmlns:a14="http://schemas.microsoft.com/office/drawing/2010/main" xmlns="" w="9525">
                 <a:solidFill>
                   <a:schemeClr val="tx1"/>
                 </a:solidFill>
@@ -13943,7 +13751,7 @@
               </a14:hiddenLine>
             </a:ext>
             <a:ext uri="{AF507438-7753-43E0-B8FC-AC1667EBCBE1}">
-              <a14:hiddenEffects xmlns:a14="http://schemas.microsoft.com/office/drawing/2010/main">
+              <a14:hiddenEffects xmlns:a14="http://schemas.microsoft.com/office/drawing/2010/main" xmlns="">
                 <a:effectLst>
                   <a:outerShdw dist="35921" dir="2700000" algn="ctr" rotWithShape="0">
                     <a:schemeClr val="bg2"/>
@@ -13957,7 +13765,7 @@
     </p:spTree>
     <p:extLst>
       <p:ext uri="{BB962C8B-B14F-4D97-AF65-F5344CB8AC3E}">
-        <p14:creationId xmlns:p14="http://schemas.microsoft.com/office/powerpoint/2010/main" val="2520379375"/>
+        <p14:creationId xmlns:p14="http://schemas.microsoft.com/office/powerpoint/2010/main" xmlns="" val="2520379375"/>
       </p:ext>
     </p:extLst>
   </p:cSld>
@@ -14369,7 +14177,7 @@
     </p:spTree>
     <p:extLst>
       <p:ext uri="{BB962C8B-B14F-4D97-AF65-F5344CB8AC3E}">
-        <p14:creationId xmlns:p14="http://schemas.microsoft.com/office/powerpoint/2010/main" val="3891151546"/>
+        <p14:creationId xmlns:p14="http://schemas.microsoft.com/office/powerpoint/2010/main" xmlns="" val="3891151546"/>
       </p:ext>
     </p:extLst>
   </p:cSld>
@@ -14651,7 +14459,7 @@
     </p:spTree>
     <p:extLst>
       <p:ext uri="{BB962C8B-B14F-4D97-AF65-F5344CB8AC3E}">
-        <p14:creationId xmlns:p14="http://schemas.microsoft.com/office/powerpoint/2010/main" val="1322811030"/>
+        <p14:creationId xmlns:p14="http://schemas.microsoft.com/office/powerpoint/2010/main" xmlns="" val="1322811030"/>
       </p:ext>
     </p:extLst>
   </p:cSld>
@@ -15628,7 +15436,30 @@
             <a:pPr lvl="2"/>
             <a:r>
               <a:rPr lang="en-US" dirty="0" smtClean="0"/>
-              <a:t>Each face maps to arbitrary edge/vertex, so we need whole output array</a:t>
+              <a:t>Each face maps to arbitrary edge/vertex, so we need whole output </a:t>
+            </a:r>
+            <a:r>
+              <a:rPr lang="en-US" dirty="0" smtClean="0"/>
+              <a:t>array</a:t>
+            </a:r>
+          </a:p>
+          <a:p>
+            <a:pPr lvl="2"/>
+            <a:r>
+              <a:rPr lang="en-US" dirty="0" smtClean="0"/>
+              <a:t>We can lower </a:t>
+            </a:r>
+            <a:r>
+              <a:rPr lang="en-US" dirty="0" err="1" smtClean="0"/>
+              <a:t>maxSize</a:t>
+            </a:r>
+            <a:r>
+              <a:rPr lang="en-US" dirty="0" smtClean="0"/>
+              <a:t>, giving up precision for </a:t>
+            </a:r>
+            <a:r>
+              <a:rPr lang="en-US" dirty="0" err="1" smtClean="0"/>
+              <a:t>runability</a:t>
             </a:r>
             <a:endParaRPr lang="en-US" dirty="0"/>
           </a:p>

</xml_diff>